<commit_message>
narrated the administrative simplification powerpoint
</commit_message>
<xml_diff>
--- a/PowerPoints/Phase 2 - Overview/009 Administrative Simplification.pptx
+++ b/PowerPoints/Phase 2 - Overview/009 Administrative Simplification.pptx
@@ -113,6 +113,22 @@
       </a:defRPr>
     </a:lvl9pPr>
   </p:defaultTextStyle>
+  <p:extLst>
+    <p:ext uri="{EFAFB233-063F-42B5-8137-9DF3F51BA10A}">
+      <p15:sldGuideLst xmlns:p15="http://schemas.microsoft.com/office/powerpoint/2012/main">
+        <p15:guide id="1" orient="horz" pos="2160">
+          <p15:clr>
+            <a:srgbClr val="A4A3A4"/>
+          </p15:clr>
+        </p15:guide>
+        <p15:guide id="2" pos="3840">
+          <p15:clr>
+            <a:srgbClr val="A4A3A4"/>
+          </p15:clr>
+        </p15:guide>
+      </p15:sldGuideLst>
+    </p:ext>
+  </p:extLst>
 </p:presentation>
 </file>
 
@@ -262,38 +278,37 @@
           <a:p>
             <a:pPr lvl="0"/>
             <a:r>
-              <a:rPr lang="en-US" smtClean="0"/>
+              <a:rPr lang="en-US"/>
               <a:t>Click to edit Master text styles</a:t>
             </a:r>
           </a:p>
           <a:p>
             <a:pPr lvl="1"/>
             <a:r>
-              <a:rPr lang="en-US" smtClean="0"/>
+              <a:rPr lang="en-US"/>
               <a:t>Second level</a:t>
             </a:r>
           </a:p>
           <a:p>
             <a:pPr lvl="2"/>
             <a:r>
-              <a:rPr lang="en-US" smtClean="0"/>
+              <a:rPr lang="en-US"/>
               <a:t>Third level</a:t>
             </a:r>
           </a:p>
           <a:p>
             <a:pPr lvl="3"/>
             <a:r>
-              <a:rPr lang="en-US" smtClean="0"/>
+              <a:rPr lang="en-US"/>
               <a:t>Fourth level</a:t>
             </a:r>
           </a:p>
           <a:p>
             <a:pPr lvl="4"/>
             <a:r>
-              <a:rPr lang="en-US" smtClean="0"/>
+              <a:rPr lang="en-US"/>
               <a:t>Fifth level</a:t>
             </a:r>
-            <a:endParaRPr lang="en-US"/>
           </a:p>
         </p:txBody>
       </p:sp>
@@ -511,11 +526,11 @@
           <a:lstStyle/>
           <a:p>
             <a:r>
-              <a:rPr lang="en-US" dirty="0" smtClean="0"/>
+              <a:rPr lang="en-US" dirty="0"/>
               <a:t>This</a:t>
             </a:r>
             <a:r>
-              <a:rPr lang="en-US" baseline="0" dirty="0" smtClean="0"/>
+              <a:rPr lang="en-US" baseline="0" dirty="0"/>
               <a:t> video will discuss administrative simplification, a key goal of the Massachusetts All-Payer Claims Database.</a:t>
             </a:r>
             <a:endParaRPr lang="en-US" dirty="0"/>
@@ -602,7 +617,7 @@
           </a:lstStyle>
           <a:p>
             <a:r>
-              <a:rPr lang="en-US" smtClean="0"/>
+              <a:rPr lang="en-US"/>
               <a:t>Click to edit Master title style</a:t>
             </a:r>
             <a:endParaRPr lang="en-US" dirty="0"/>
@@ -676,7 +691,7 @@
           </a:lstStyle>
           <a:p>
             <a:r>
-              <a:rPr lang="en-US" smtClean="0"/>
+              <a:rPr lang="en-US"/>
               <a:t>Click to edit Master subtitle style</a:t>
             </a:r>
             <a:endParaRPr lang="en-US" dirty="0"/>
@@ -794,10 +809,9 @@
           <a:lstStyle/>
           <a:p>
             <a:r>
-              <a:rPr lang="en-US" smtClean="0"/>
+              <a:rPr lang="en-US"/>
               <a:t>Click to edit Master title style</a:t>
             </a:r>
-            <a:endParaRPr lang="en-US"/>
           </a:p>
         </p:txBody>
       </p:sp>
@@ -818,35 +832,35 @@
           <a:p>
             <a:pPr lvl="0"/>
             <a:r>
-              <a:rPr lang="en-US" smtClean="0"/>
+              <a:rPr lang="en-US"/>
               <a:t>Edit Master text styles</a:t>
             </a:r>
           </a:p>
           <a:p>
             <a:pPr lvl="1"/>
             <a:r>
-              <a:rPr lang="en-US" smtClean="0"/>
+              <a:rPr lang="en-US"/>
               <a:t>Second level</a:t>
             </a:r>
           </a:p>
           <a:p>
             <a:pPr lvl="2"/>
             <a:r>
-              <a:rPr lang="en-US" smtClean="0"/>
+              <a:rPr lang="en-US"/>
               <a:t>Third level</a:t>
             </a:r>
           </a:p>
           <a:p>
             <a:pPr lvl="3"/>
             <a:r>
-              <a:rPr lang="en-US" smtClean="0"/>
+              <a:rPr lang="en-US"/>
               <a:t>Fourth level</a:t>
             </a:r>
           </a:p>
           <a:p>
             <a:pPr lvl="4"/>
             <a:r>
-              <a:rPr lang="en-US" smtClean="0"/>
+              <a:rPr lang="en-US"/>
               <a:t>Fifth level</a:t>
             </a:r>
             <a:endParaRPr lang="en-US" dirty="0"/>
@@ -969,10 +983,9 @@
           <a:lstStyle/>
           <a:p>
             <a:r>
-              <a:rPr lang="en-US" smtClean="0"/>
+              <a:rPr lang="en-US"/>
               <a:t>Click to edit Master title style</a:t>
             </a:r>
-            <a:endParaRPr lang="en-US"/>
           </a:p>
         </p:txBody>
       </p:sp>
@@ -998,38 +1011,37 @@
           <a:p>
             <a:pPr lvl="0"/>
             <a:r>
-              <a:rPr lang="en-US" smtClean="0"/>
+              <a:rPr lang="en-US"/>
               <a:t>Edit Master text styles</a:t>
             </a:r>
           </a:p>
           <a:p>
             <a:pPr lvl="1"/>
             <a:r>
-              <a:rPr lang="en-US" smtClean="0"/>
+              <a:rPr lang="en-US"/>
               <a:t>Second level</a:t>
             </a:r>
           </a:p>
           <a:p>
             <a:pPr lvl="2"/>
             <a:r>
-              <a:rPr lang="en-US" smtClean="0"/>
+              <a:rPr lang="en-US"/>
               <a:t>Third level</a:t>
             </a:r>
           </a:p>
           <a:p>
             <a:pPr lvl="3"/>
             <a:r>
-              <a:rPr lang="en-US" smtClean="0"/>
+              <a:rPr lang="en-US"/>
               <a:t>Fourth level</a:t>
             </a:r>
           </a:p>
           <a:p>
             <a:pPr lvl="4"/>
             <a:r>
-              <a:rPr lang="en-US" smtClean="0"/>
+              <a:rPr lang="en-US"/>
               <a:t>Fifth level</a:t>
             </a:r>
-            <a:endParaRPr lang="en-US"/>
           </a:p>
         </p:txBody>
       </p:sp>
@@ -1155,7 +1167,7 @@
           </a:lstStyle>
           <a:p>
             <a:r>
-              <a:rPr lang="en-US" smtClean="0"/>
+              <a:rPr lang="en-US"/>
               <a:t>Click to edit Master title style</a:t>
             </a:r>
             <a:endParaRPr lang="en-US" dirty="0"/>
@@ -1226,7 +1238,7 @@
           </a:lstStyle>
           <a:p>
             <a:r>
-              <a:rPr lang="en-US" smtClean="0"/>
+              <a:rPr lang="en-US"/>
               <a:t>Click to edit Master subtitle style</a:t>
             </a:r>
             <a:endParaRPr lang="en-US" dirty="0"/>
@@ -1391,7 +1403,7 @@
           <a:lstStyle/>
           <a:p>
             <a:r>
-              <a:rPr lang="en-US" smtClean="0"/>
+              <a:rPr lang="en-US"/>
               <a:t>Click to edit Master title style</a:t>
             </a:r>
             <a:endParaRPr lang="en-US" dirty="0"/>
@@ -1415,35 +1427,35 @@
           <a:p>
             <a:pPr lvl="0"/>
             <a:r>
-              <a:rPr lang="en-US" smtClean="0"/>
+              <a:rPr lang="en-US"/>
               <a:t>Edit Master text styles</a:t>
             </a:r>
           </a:p>
           <a:p>
             <a:pPr lvl="1"/>
             <a:r>
-              <a:rPr lang="en-US" smtClean="0"/>
+              <a:rPr lang="en-US"/>
               <a:t>Second level</a:t>
             </a:r>
           </a:p>
           <a:p>
             <a:pPr lvl="2"/>
             <a:r>
-              <a:rPr lang="en-US" smtClean="0"/>
+              <a:rPr lang="en-US"/>
               <a:t>Third level</a:t>
             </a:r>
           </a:p>
           <a:p>
             <a:pPr lvl="3"/>
             <a:r>
-              <a:rPr lang="en-US" smtClean="0"/>
+              <a:rPr lang="en-US"/>
               <a:t>Fourth level</a:t>
             </a:r>
           </a:p>
           <a:p>
             <a:pPr lvl="4"/>
             <a:r>
-              <a:rPr lang="en-US" smtClean="0"/>
+              <a:rPr lang="en-US"/>
               <a:t>Fifth level</a:t>
             </a:r>
             <a:endParaRPr lang="en-US" dirty="0"/>
@@ -1609,7 +1621,7 @@
           </a:lstStyle>
           <a:p>
             <a:r>
-              <a:rPr lang="en-US" smtClean="0"/>
+              <a:rPr lang="en-US"/>
               <a:t>Click to edit Master title style</a:t>
             </a:r>
             <a:endParaRPr lang="en-US" dirty="0"/>
@@ -1729,7 +1741,7 @@
           <a:p>
             <a:pPr lvl="0"/>
             <a:r>
-              <a:rPr lang="en-US" smtClean="0"/>
+              <a:rPr lang="en-US"/>
               <a:t>Edit Master text styles</a:t>
             </a:r>
           </a:p>
@@ -1888,7 +1900,7 @@
           <a:lstStyle/>
           <a:p>
             <a:r>
-              <a:rPr lang="en-US" smtClean="0"/>
+              <a:rPr lang="en-US"/>
               <a:t>Click to edit Master title style</a:t>
             </a:r>
             <a:endParaRPr lang="en-US" dirty="0"/>
@@ -1917,35 +1929,35 @@
           <a:p>
             <a:pPr lvl="0"/>
             <a:r>
-              <a:rPr lang="en-US" smtClean="0"/>
+              <a:rPr lang="en-US"/>
               <a:t>Edit Master text styles</a:t>
             </a:r>
           </a:p>
           <a:p>
             <a:pPr lvl="1"/>
             <a:r>
-              <a:rPr lang="en-US" smtClean="0"/>
+              <a:rPr lang="en-US"/>
               <a:t>Second level</a:t>
             </a:r>
           </a:p>
           <a:p>
             <a:pPr lvl="2"/>
             <a:r>
-              <a:rPr lang="en-US" smtClean="0"/>
+              <a:rPr lang="en-US"/>
               <a:t>Third level</a:t>
             </a:r>
           </a:p>
           <a:p>
             <a:pPr lvl="3"/>
             <a:r>
-              <a:rPr lang="en-US" smtClean="0"/>
+              <a:rPr lang="en-US"/>
               <a:t>Fourth level</a:t>
             </a:r>
           </a:p>
           <a:p>
             <a:pPr lvl="4"/>
             <a:r>
-              <a:rPr lang="en-US" smtClean="0"/>
+              <a:rPr lang="en-US"/>
               <a:t>Fifth level</a:t>
             </a:r>
             <a:endParaRPr lang="en-US" dirty="0"/>
@@ -1974,35 +1986,35 @@
           <a:p>
             <a:pPr lvl="0"/>
             <a:r>
-              <a:rPr lang="en-US" smtClean="0"/>
+              <a:rPr lang="en-US"/>
               <a:t>Edit Master text styles</a:t>
             </a:r>
           </a:p>
           <a:p>
             <a:pPr lvl="1"/>
             <a:r>
-              <a:rPr lang="en-US" smtClean="0"/>
+              <a:rPr lang="en-US"/>
               <a:t>Second level</a:t>
             </a:r>
           </a:p>
           <a:p>
             <a:pPr lvl="2"/>
             <a:r>
-              <a:rPr lang="en-US" smtClean="0"/>
+              <a:rPr lang="en-US"/>
               <a:t>Third level</a:t>
             </a:r>
           </a:p>
           <a:p>
             <a:pPr lvl="3"/>
             <a:r>
-              <a:rPr lang="en-US" smtClean="0"/>
+              <a:rPr lang="en-US"/>
               <a:t>Fourth level</a:t>
             </a:r>
           </a:p>
           <a:p>
             <a:pPr lvl="4"/>
             <a:r>
-              <a:rPr lang="en-US" smtClean="0"/>
+              <a:rPr lang="en-US"/>
               <a:t>Fifth level</a:t>
             </a:r>
             <a:endParaRPr lang="en-US" dirty="0"/>
@@ -2123,7 +2135,7 @@
   </p:clrMapOvr>
   <p:extLst>
     <p:ext uri="{DCECCB84-F9BA-43D5-87BE-67443E8EF086}">
-      <p15:sldGuideLst xmlns:p15="http://schemas.microsoft.com/office/powerpoint/2012/main" xmlns=""/>
+      <p15:sldGuideLst xmlns:p15="http://schemas.microsoft.com/office/powerpoint/2012/main"/>
     </p:ext>
   </p:extLst>
 </p:sldLayout>
@@ -2167,7 +2179,7 @@
           <a:lstStyle/>
           <a:p>
             <a:r>
-              <a:rPr lang="en-US" smtClean="0"/>
+              <a:rPr lang="en-US"/>
               <a:t>Click to edit Master title style</a:t>
             </a:r>
             <a:endParaRPr lang="en-US" dirty="0"/>
@@ -2242,7 +2254,7 @@
           <a:p>
             <a:pPr lvl="0"/>
             <a:r>
-              <a:rPr lang="en-US" smtClean="0"/>
+              <a:rPr lang="en-US"/>
               <a:t>Edit Master text styles</a:t>
             </a:r>
           </a:p>
@@ -2270,35 +2282,35 @@
           <a:p>
             <a:pPr lvl="0"/>
             <a:r>
-              <a:rPr lang="en-US" smtClean="0"/>
+              <a:rPr lang="en-US"/>
               <a:t>Edit Master text styles</a:t>
             </a:r>
           </a:p>
           <a:p>
             <a:pPr lvl="1"/>
             <a:r>
-              <a:rPr lang="en-US" smtClean="0"/>
+              <a:rPr lang="en-US"/>
               <a:t>Second level</a:t>
             </a:r>
           </a:p>
           <a:p>
             <a:pPr lvl="2"/>
             <a:r>
-              <a:rPr lang="en-US" smtClean="0"/>
+              <a:rPr lang="en-US"/>
               <a:t>Third level</a:t>
             </a:r>
           </a:p>
           <a:p>
             <a:pPr lvl="3"/>
             <a:r>
-              <a:rPr lang="en-US" smtClean="0"/>
+              <a:rPr lang="en-US"/>
               <a:t>Fourth level</a:t>
             </a:r>
           </a:p>
           <a:p>
             <a:pPr lvl="4"/>
             <a:r>
-              <a:rPr lang="en-US" smtClean="0"/>
+              <a:rPr lang="en-US"/>
               <a:t>Fifth level</a:t>
             </a:r>
             <a:endParaRPr lang="en-US" dirty="0"/>
@@ -2373,7 +2385,7 @@
           <a:p>
             <a:pPr lvl="0"/>
             <a:r>
-              <a:rPr lang="en-US" smtClean="0"/>
+              <a:rPr lang="en-US"/>
               <a:t>Edit Master text styles</a:t>
             </a:r>
           </a:p>
@@ -2401,35 +2413,35 @@
           <a:p>
             <a:pPr lvl="0"/>
             <a:r>
-              <a:rPr lang="en-US" smtClean="0"/>
+              <a:rPr lang="en-US"/>
               <a:t>Edit Master text styles</a:t>
             </a:r>
           </a:p>
           <a:p>
             <a:pPr lvl="1"/>
             <a:r>
-              <a:rPr lang="en-US" smtClean="0"/>
+              <a:rPr lang="en-US"/>
               <a:t>Second level</a:t>
             </a:r>
           </a:p>
           <a:p>
             <a:pPr lvl="2"/>
             <a:r>
-              <a:rPr lang="en-US" smtClean="0"/>
+              <a:rPr lang="en-US"/>
               <a:t>Third level</a:t>
             </a:r>
           </a:p>
           <a:p>
             <a:pPr lvl="3"/>
             <a:r>
-              <a:rPr lang="en-US" smtClean="0"/>
+              <a:rPr lang="en-US"/>
               <a:t>Fourth level</a:t>
             </a:r>
           </a:p>
           <a:p>
             <a:pPr lvl="4"/>
             <a:r>
-              <a:rPr lang="en-US" smtClean="0"/>
+              <a:rPr lang="en-US"/>
               <a:t>Fifth level</a:t>
             </a:r>
             <a:endParaRPr lang="en-US" dirty="0"/>
@@ -2550,7 +2562,7 @@
   </p:clrMapOvr>
   <p:extLst>
     <p:ext uri="{DCECCB84-F9BA-43D5-87BE-67443E8EF086}">
-      <p15:sldGuideLst xmlns:p15="http://schemas.microsoft.com/office/powerpoint/2012/main" xmlns=""/>
+      <p15:sldGuideLst xmlns:p15="http://schemas.microsoft.com/office/powerpoint/2012/main"/>
     </p:ext>
   </p:extLst>
 </p:sldLayout>
@@ -2589,7 +2601,7 @@
           <a:lstStyle/>
           <a:p>
             <a:r>
-              <a:rPr lang="en-US" smtClean="0"/>
+              <a:rPr lang="en-US"/>
               <a:t>Click to edit Master title style</a:t>
             </a:r>
             <a:endParaRPr lang="en-US" dirty="0"/>
@@ -2850,7 +2862,7 @@
           </a:lstStyle>
           <a:p>
             <a:r>
-              <a:rPr lang="en-US" smtClean="0"/>
+              <a:rPr lang="en-US"/>
               <a:t>Click to edit Master title style</a:t>
             </a:r>
             <a:endParaRPr lang="en-US" dirty="0"/>
@@ -2879,35 +2891,35 @@
           <a:p>
             <a:pPr lvl="0"/>
             <a:r>
-              <a:rPr lang="en-US" smtClean="0"/>
+              <a:rPr lang="en-US"/>
               <a:t>Edit Master text styles</a:t>
             </a:r>
           </a:p>
           <a:p>
             <a:pPr lvl="1"/>
             <a:r>
-              <a:rPr lang="en-US" smtClean="0"/>
+              <a:rPr lang="en-US"/>
               <a:t>Second level</a:t>
             </a:r>
           </a:p>
           <a:p>
             <a:pPr lvl="2"/>
             <a:r>
-              <a:rPr lang="en-US" smtClean="0"/>
+              <a:rPr lang="en-US"/>
               <a:t>Third level</a:t>
             </a:r>
           </a:p>
           <a:p>
             <a:pPr lvl="3"/>
             <a:r>
-              <a:rPr lang="en-US" smtClean="0"/>
+              <a:rPr lang="en-US"/>
               <a:t>Fourth level</a:t>
             </a:r>
           </a:p>
           <a:p>
             <a:pPr lvl="4"/>
             <a:r>
-              <a:rPr lang="en-US" smtClean="0"/>
+              <a:rPr lang="en-US"/>
               <a:t>Fifth level</a:t>
             </a:r>
             <a:endParaRPr lang="en-US" dirty="0"/>
@@ -2973,7 +2985,7 @@
           <a:p>
             <a:pPr lvl="0"/>
             <a:r>
-              <a:rPr lang="en-US" smtClean="0"/>
+              <a:rPr lang="en-US"/>
               <a:t>Edit Master text styles</a:t>
             </a:r>
           </a:p>
@@ -3093,7 +3105,7 @@
   </p:clrMapOvr>
   <p:extLst>
     <p:ext uri="{DCECCB84-F9BA-43D5-87BE-67443E8EF086}">
-      <p15:sldGuideLst xmlns:p15="http://schemas.microsoft.com/office/powerpoint/2012/main" xmlns=""/>
+      <p15:sldGuideLst xmlns:p15="http://schemas.microsoft.com/office/powerpoint/2012/main"/>
     </p:ext>
   </p:extLst>
 </p:sldLayout>
@@ -3132,7 +3144,7 @@
           <a:lstStyle/>
           <a:p>
             <a:r>
-              <a:rPr lang="en-US" smtClean="0"/>
+              <a:rPr lang="en-US"/>
               <a:t>Click to edit Master title style</a:t>
             </a:r>
             <a:endParaRPr lang="en-US" dirty="0"/>
@@ -3156,35 +3168,35 @@
           <a:p>
             <a:pPr lvl="0"/>
             <a:r>
-              <a:rPr lang="en-US" smtClean="0"/>
+              <a:rPr lang="en-US"/>
               <a:t>Edit Master text styles</a:t>
             </a:r>
           </a:p>
           <a:p>
             <a:pPr lvl="1"/>
             <a:r>
-              <a:rPr lang="en-US" smtClean="0"/>
+              <a:rPr lang="en-US"/>
               <a:t>Second level</a:t>
             </a:r>
           </a:p>
           <a:p>
             <a:pPr lvl="2"/>
             <a:r>
-              <a:rPr lang="en-US" smtClean="0"/>
+              <a:rPr lang="en-US"/>
               <a:t>Third level</a:t>
             </a:r>
           </a:p>
           <a:p>
             <a:pPr lvl="3"/>
             <a:r>
-              <a:rPr lang="en-US" smtClean="0"/>
+              <a:rPr lang="en-US"/>
               <a:t>Fourth level</a:t>
             </a:r>
           </a:p>
           <a:p>
             <a:pPr lvl="4"/>
             <a:r>
-              <a:rPr lang="en-US" smtClean="0"/>
+              <a:rPr lang="en-US"/>
               <a:t>Fifth level</a:t>
             </a:r>
             <a:endParaRPr lang="en-US" dirty="0"/>
@@ -3451,7 +3463,7 @@
           </a:lstStyle>
           <a:p>
             <a:r>
-              <a:rPr lang="en-US" smtClean="0"/>
+              <a:rPr lang="en-US"/>
               <a:t>Click to edit Master title style</a:t>
             </a:r>
             <a:endParaRPr lang="en-US" dirty="0"/>
@@ -3526,7 +3538,7 @@
           </a:lstStyle>
           <a:p>
             <a:r>
-              <a:rPr lang="en-US" smtClean="0"/>
+              <a:rPr lang="en-US"/>
               <a:t>Click icon to add picture</a:t>
             </a:r>
             <a:endParaRPr lang="en-US" dirty="0"/>
@@ -3594,7 +3606,7 @@
           <a:p>
             <a:pPr lvl="0"/>
             <a:r>
-              <a:rPr lang="en-US" smtClean="0"/>
+              <a:rPr lang="en-US"/>
               <a:t>Edit Master text styles</a:t>
             </a:r>
           </a:p>
@@ -3762,7 +3774,7 @@
           <a:lstStyle/>
           <a:p>
             <a:r>
-              <a:rPr lang="en-US" smtClean="0"/>
+              <a:rPr lang="en-US"/>
               <a:t>Click to edit Master title style</a:t>
             </a:r>
             <a:endParaRPr lang="en-US" dirty="0"/>
@@ -3786,35 +3798,35 @@
           <a:p>
             <a:pPr lvl="0"/>
             <a:r>
-              <a:rPr lang="en-US" smtClean="0"/>
+              <a:rPr lang="en-US"/>
               <a:t>Edit Master text styles</a:t>
             </a:r>
           </a:p>
           <a:p>
             <a:pPr lvl="1"/>
             <a:r>
-              <a:rPr lang="en-US" smtClean="0"/>
+              <a:rPr lang="en-US"/>
               <a:t>Second level</a:t>
             </a:r>
           </a:p>
           <a:p>
             <a:pPr lvl="2"/>
             <a:r>
-              <a:rPr lang="en-US" smtClean="0"/>
+              <a:rPr lang="en-US"/>
               <a:t>Third level</a:t>
             </a:r>
           </a:p>
           <a:p>
             <a:pPr lvl="3"/>
             <a:r>
-              <a:rPr lang="en-US" smtClean="0"/>
+              <a:rPr lang="en-US"/>
               <a:t>Fourth level</a:t>
             </a:r>
           </a:p>
           <a:p>
             <a:pPr lvl="4"/>
             <a:r>
-              <a:rPr lang="en-US" smtClean="0"/>
+              <a:rPr lang="en-US"/>
               <a:t>Fifth level</a:t>
             </a:r>
             <a:endParaRPr lang="en-US" dirty="0"/>
@@ -3978,7 +3990,7 @@
           </a:lstStyle>
           <a:p>
             <a:r>
-              <a:rPr lang="en-US" smtClean="0"/>
+              <a:rPr lang="en-US"/>
               <a:t>Click to edit Master title style</a:t>
             </a:r>
             <a:endParaRPr lang="en-US" dirty="0"/>
@@ -4007,35 +4019,35 @@
           <a:p>
             <a:pPr lvl="0"/>
             <a:r>
-              <a:rPr lang="en-US" smtClean="0"/>
+              <a:rPr lang="en-US"/>
               <a:t>Edit Master text styles</a:t>
             </a:r>
           </a:p>
           <a:p>
             <a:pPr lvl="1"/>
             <a:r>
-              <a:rPr lang="en-US" smtClean="0"/>
+              <a:rPr lang="en-US"/>
               <a:t>Second level</a:t>
             </a:r>
           </a:p>
           <a:p>
             <a:pPr lvl="2"/>
             <a:r>
-              <a:rPr lang="en-US" smtClean="0"/>
+              <a:rPr lang="en-US"/>
               <a:t>Third level</a:t>
             </a:r>
           </a:p>
           <a:p>
             <a:pPr lvl="3"/>
             <a:r>
-              <a:rPr lang="en-US" smtClean="0"/>
+              <a:rPr lang="en-US"/>
               <a:t>Fourth level</a:t>
             </a:r>
           </a:p>
           <a:p>
             <a:pPr lvl="4"/>
             <a:r>
-              <a:rPr lang="en-US" smtClean="0"/>
+              <a:rPr lang="en-US"/>
               <a:t>Fifth level</a:t>
             </a:r>
             <a:endParaRPr lang="en-US" dirty="0"/>
@@ -4201,7 +4213,7 @@
           </a:lstStyle>
           <a:p>
             <a:r>
-              <a:rPr lang="en-US" smtClean="0"/>
+              <a:rPr lang="en-US"/>
               <a:t>Click to edit Master title style</a:t>
             </a:r>
             <a:endParaRPr lang="en-US" dirty="0"/>
@@ -4324,7 +4336,7 @@
           <a:p>
             <a:pPr lvl="0"/>
             <a:r>
-              <a:rPr lang="en-US" smtClean="0"/>
+              <a:rPr lang="en-US"/>
               <a:t>Edit Master text styles</a:t>
             </a:r>
           </a:p>
@@ -4441,7 +4453,7 @@
           <a:lstStyle/>
           <a:p>
             <a:r>
-              <a:rPr lang="en-US" smtClean="0"/>
+              <a:rPr lang="en-US"/>
               <a:t>Click to edit Master title style</a:t>
             </a:r>
             <a:endParaRPr lang="en-US" dirty="0"/>
@@ -4470,35 +4482,35 @@
           <a:p>
             <a:pPr lvl="0"/>
             <a:r>
-              <a:rPr lang="en-US" smtClean="0"/>
+              <a:rPr lang="en-US"/>
               <a:t>Edit Master text styles</a:t>
             </a:r>
           </a:p>
           <a:p>
             <a:pPr lvl="1"/>
             <a:r>
-              <a:rPr lang="en-US" smtClean="0"/>
+              <a:rPr lang="en-US"/>
               <a:t>Second level</a:t>
             </a:r>
           </a:p>
           <a:p>
             <a:pPr lvl="2"/>
             <a:r>
-              <a:rPr lang="en-US" smtClean="0"/>
+              <a:rPr lang="en-US"/>
               <a:t>Third level</a:t>
             </a:r>
           </a:p>
           <a:p>
             <a:pPr lvl="3"/>
             <a:r>
-              <a:rPr lang="en-US" smtClean="0"/>
+              <a:rPr lang="en-US"/>
               <a:t>Fourth level</a:t>
             </a:r>
           </a:p>
           <a:p>
             <a:pPr lvl="4"/>
             <a:r>
-              <a:rPr lang="en-US" smtClean="0"/>
+              <a:rPr lang="en-US"/>
               <a:t>Fifth level</a:t>
             </a:r>
             <a:endParaRPr lang="en-US" dirty="0"/>
@@ -4527,35 +4539,35 @@
           <a:p>
             <a:pPr lvl="0"/>
             <a:r>
-              <a:rPr lang="en-US" smtClean="0"/>
+              <a:rPr lang="en-US"/>
               <a:t>Edit Master text styles</a:t>
             </a:r>
           </a:p>
           <a:p>
             <a:pPr lvl="1"/>
             <a:r>
-              <a:rPr lang="en-US" smtClean="0"/>
+              <a:rPr lang="en-US"/>
               <a:t>Second level</a:t>
             </a:r>
           </a:p>
           <a:p>
             <a:pPr lvl="2"/>
             <a:r>
-              <a:rPr lang="en-US" smtClean="0"/>
+              <a:rPr lang="en-US"/>
               <a:t>Third level</a:t>
             </a:r>
           </a:p>
           <a:p>
             <a:pPr lvl="3"/>
             <a:r>
-              <a:rPr lang="en-US" smtClean="0"/>
+              <a:rPr lang="en-US"/>
               <a:t>Fourth level</a:t>
             </a:r>
           </a:p>
           <a:p>
             <a:pPr lvl="4"/>
             <a:r>
-              <a:rPr lang="en-US" smtClean="0"/>
+              <a:rPr lang="en-US"/>
               <a:t>Fifth level</a:t>
             </a:r>
             <a:endParaRPr lang="en-US" dirty="0"/>
@@ -4639,7 +4651,7 @@
   </p:clrMapOvr>
   <p:extLst>
     <p:ext uri="{DCECCB84-F9BA-43D5-87BE-67443E8EF086}">
-      <p15:sldGuideLst xmlns:p15="http://schemas.microsoft.com/office/powerpoint/2012/main" xmlns=""/>
+      <p15:sldGuideLst xmlns:p15="http://schemas.microsoft.com/office/powerpoint/2012/main"/>
     </p:ext>
   </p:extLst>
 </p:sldLayout>
@@ -4726,7 +4738,7 @@
           <a:p>
             <a:pPr lvl="0"/>
             <a:r>
-              <a:rPr lang="en-US" smtClean="0"/>
+              <a:rPr lang="en-US"/>
               <a:t>Edit Master text styles</a:t>
             </a:r>
           </a:p>
@@ -4754,35 +4766,35 @@
           <a:p>
             <a:pPr lvl="0"/>
             <a:r>
-              <a:rPr lang="en-US" smtClean="0"/>
+              <a:rPr lang="en-US"/>
               <a:t>Edit Master text styles</a:t>
             </a:r>
           </a:p>
           <a:p>
             <a:pPr lvl="1"/>
             <a:r>
-              <a:rPr lang="en-US" smtClean="0"/>
+              <a:rPr lang="en-US"/>
               <a:t>Second level</a:t>
             </a:r>
           </a:p>
           <a:p>
             <a:pPr lvl="2"/>
             <a:r>
-              <a:rPr lang="en-US" smtClean="0"/>
+              <a:rPr lang="en-US"/>
               <a:t>Third level</a:t>
             </a:r>
           </a:p>
           <a:p>
             <a:pPr lvl="3"/>
             <a:r>
-              <a:rPr lang="en-US" smtClean="0"/>
+              <a:rPr lang="en-US"/>
               <a:t>Fourth level</a:t>
             </a:r>
           </a:p>
           <a:p>
             <a:pPr lvl="4"/>
             <a:r>
-              <a:rPr lang="en-US" smtClean="0"/>
+              <a:rPr lang="en-US"/>
               <a:t>Fifth level</a:t>
             </a:r>
             <a:endParaRPr lang="en-US" dirty="0"/>
@@ -4851,7 +4863,7 @@
           <a:p>
             <a:pPr lvl="0"/>
             <a:r>
-              <a:rPr lang="en-US" smtClean="0"/>
+              <a:rPr lang="en-US"/>
               <a:t>Edit Master text styles</a:t>
             </a:r>
           </a:p>
@@ -4879,38 +4891,37 @@
           <a:p>
             <a:pPr lvl="0"/>
             <a:r>
-              <a:rPr lang="en-US" smtClean="0"/>
+              <a:rPr lang="en-US"/>
               <a:t>Edit Master text styles</a:t>
             </a:r>
           </a:p>
           <a:p>
             <a:pPr lvl="1"/>
             <a:r>
-              <a:rPr lang="en-US" smtClean="0"/>
+              <a:rPr lang="en-US"/>
               <a:t>Second level</a:t>
             </a:r>
           </a:p>
           <a:p>
             <a:pPr lvl="2"/>
             <a:r>
-              <a:rPr lang="en-US" smtClean="0"/>
+              <a:rPr lang="en-US"/>
               <a:t>Third level</a:t>
             </a:r>
           </a:p>
           <a:p>
             <a:pPr lvl="3"/>
             <a:r>
-              <a:rPr lang="en-US" smtClean="0"/>
+              <a:rPr lang="en-US"/>
               <a:t>Fourth level</a:t>
             </a:r>
           </a:p>
           <a:p>
             <a:pPr lvl="4"/>
             <a:r>
-              <a:rPr lang="en-US" smtClean="0"/>
+              <a:rPr lang="en-US"/>
               <a:t>Fifth level</a:t>
             </a:r>
-            <a:endParaRPr lang="en-US"/>
           </a:p>
         </p:txBody>
       </p:sp>
@@ -4995,7 +5006,7 @@
           <a:lstStyle/>
           <a:p>
             <a:r>
-              <a:rPr lang="en-US" smtClean="0"/>
+              <a:rPr lang="en-US"/>
               <a:t>Click to edit Master title style</a:t>
             </a:r>
             <a:endParaRPr lang="en-US" dirty="0"/>
@@ -5014,7 +5025,7 @@
   </p:clrMapOvr>
   <p:extLst>
     <p:ext uri="{DCECCB84-F9BA-43D5-87BE-67443E8EF086}">
-      <p15:sldGuideLst xmlns:p15="http://schemas.microsoft.com/office/powerpoint/2012/main" xmlns=""/>
+      <p15:sldGuideLst xmlns:p15="http://schemas.microsoft.com/office/powerpoint/2012/main"/>
     </p:ext>
   </p:extLst>
 </p:sldLayout>
@@ -5118,10 +5129,9 @@
           <a:lstStyle/>
           <a:p>
             <a:r>
-              <a:rPr lang="en-US" smtClean="0"/>
+              <a:rPr lang="en-US"/>
               <a:t>Click to edit Master title style</a:t>
             </a:r>
-            <a:endParaRPr lang="en-US"/>
           </a:p>
         </p:txBody>
       </p:sp>
@@ -5277,7 +5287,7 @@
           </a:lstStyle>
           <a:p>
             <a:r>
-              <a:rPr lang="en-US" smtClean="0"/>
+              <a:rPr lang="en-US"/>
               <a:t>Click to edit Master title style</a:t>
             </a:r>
             <a:endParaRPr lang="en-US" dirty="0"/>
@@ -5334,35 +5344,35 @@
           <a:p>
             <a:pPr lvl="0"/>
             <a:r>
-              <a:rPr lang="en-US" smtClean="0"/>
+              <a:rPr lang="en-US"/>
               <a:t>Edit Master text styles</a:t>
             </a:r>
           </a:p>
           <a:p>
             <a:pPr lvl="1"/>
             <a:r>
-              <a:rPr lang="en-US" smtClean="0"/>
+              <a:rPr lang="en-US"/>
               <a:t>Second level</a:t>
             </a:r>
           </a:p>
           <a:p>
             <a:pPr lvl="2"/>
             <a:r>
-              <a:rPr lang="en-US" smtClean="0"/>
+              <a:rPr lang="en-US"/>
               <a:t>Third level</a:t>
             </a:r>
           </a:p>
           <a:p>
             <a:pPr lvl="3"/>
             <a:r>
-              <a:rPr lang="en-US" smtClean="0"/>
+              <a:rPr lang="en-US"/>
               <a:t>Fourth level</a:t>
             </a:r>
           </a:p>
           <a:p>
             <a:pPr lvl="4"/>
             <a:r>
-              <a:rPr lang="en-US" smtClean="0"/>
+              <a:rPr lang="en-US"/>
               <a:t>Fifth level</a:t>
             </a:r>
             <a:endParaRPr lang="en-US" dirty="0"/>
@@ -5433,7 +5443,7 @@
           <a:p>
             <a:pPr lvl="0"/>
             <a:r>
-              <a:rPr lang="en-US" smtClean="0"/>
+              <a:rPr lang="en-US"/>
               <a:t>Edit Master text styles</a:t>
             </a:r>
           </a:p>
@@ -5516,7 +5526,7 @@
   </p:clrMapOvr>
   <p:extLst>
     <p:ext uri="{DCECCB84-F9BA-43D5-87BE-67443E8EF086}">
-      <p15:sldGuideLst xmlns:p15="http://schemas.microsoft.com/office/powerpoint/2012/main" xmlns=""/>
+      <p15:sldGuideLst xmlns:p15="http://schemas.microsoft.com/office/powerpoint/2012/main"/>
     </p:ext>
   </p:extLst>
 </p:sldLayout>
@@ -5566,7 +5576,7 @@
           </a:lstStyle>
           <a:p>
             <a:r>
-              <a:rPr lang="en-US" smtClean="0"/>
+              <a:rPr lang="en-US"/>
               <a:t>Click to edit Master title style</a:t>
             </a:r>
             <a:endParaRPr lang="en-US" dirty="0"/>
@@ -5631,7 +5641,7 @@
           </a:lstStyle>
           <a:p>
             <a:r>
-              <a:rPr lang="en-US" smtClean="0"/>
+              <a:rPr lang="en-US"/>
               <a:t>Click icon to add picture</a:t>
             </a:r>
             <a:endParaRPr lang="en-US" dirty="0"/>
@@ -5702,7 +5712,7 @@
           <a:p>
             <a:pPr lvl="0"/>
             <a:r>
-              <a:rPr lang="en-US" smtClean="0"/>
+              <a:rPr lang="en-US"/>
               <a:t>Edit Master text styles</a:t>
             </a:r>
           </a:p>
@@ -5834,7 +5844,7 @@
           <a:lstStyle/>
           <a:p>
             <a:r>
-              <a:rPr lang="en-US" smtClean="0"/>
+              <a:rPr lang="en-US"/>
               <a:t>Click to edit Master title style</a:t>
             </a:r>
             <a:endParaRPr lang="en-US" dirty="0"/>
@@ -5868,35 +5878,35 @@
           <a:p>
             <a:pPr lvl="0"/>
             <a:r>
-              <a:rPr lang="en-US" smtClean="0"/>
+              <a:rPr lang="en-US"/>
               <a:t>Edit Master text styles</a:t>
             </a:r>
           </a:p>
           <a:p>
             <a:pPr lvl="1"/>
             <a:r>
-              <a:rPr lang="en-US" smtClean="0"/>
+              <a:rPr lang="en-US"/>
               <a:t>Second level</a:t>
             </a:r>
           </a:p>
           <a:p>
             <a:pPr lvl="2"/>
             <a:r>
-              <a:rPr lang="en-US" smtClean="0"/>
+              <a:rPr lang="en-US"/>
               <a:t>Third level</a:t>
             </a:r>
           </a:p>
           <a:p>
             <a:pPr lvl="3"/>
             <a:r>
-              <a:rPr lang="en-US" smtClean="0"/>
+              <a:rPr lang="en-US"/>
               <a:t>Fourth level</a:t>
             </a:r>
           </a:p>
           <a:p>
             <a:pPr lvl="4"/>
             <a:r>
-              <a:rPr lang="en-US" smtClean="0"/>
+              <a:rPr lang="en-US"/>
               <a:t>Fifth level</a:t>
             </a:r>
             <a:endParaRPr lang="en-US" dirty="0"/>
@@ -6315,7 +6325,7 @@
   </p:txStyles>
   <p:extLst>
     <p:ext uri="{27BBF7A9-308A-43DC-89C8-2F10F3537804}">
-      <p15:sldGuideLst xmlns:p15="http://schemas.microsoft.com/office/powerpoint/2012/main" xmlns=""/>
+      <p15:sldGuideLst xmlns:p15="http://schemas.microsoft.com/office/powerpoint/2012/main"/>
     </p:ext>
   </p:extLst>
 </p:sldMaster>
@@ -6441,7 +6451,7 @@
           <a:lstStyle/>
           <a:p>
             <a:r>
-              <a:rPr lang="en-US" smtClean="0"/>
+              <a:rPr lang="en-US"/>
               <a:t>Click to edit Master title style</a:t>
             </a:r>
             <a:endParaRPr lang="en-US" dirty="0"/>
@@ -7012,7 +7022,7 @@
   </p:txStyles>
   <p:extLst>
     <p:ext uri="{27BBF7A9-308A-43DC-89C8-2F10F3537804}">
-      <p15:sldGuideLst xmlns:p15="http://schemas.microsoft.com/office/powerpoint/2012/main" xmlns=""/>
+      <p15:sldGuideLst xmlns:p15="http://schemas.microsoft.com/office/powerpoint/2012/main"/>
     </p:ext>
   </p:extLst>
 </p:sldMaster>
@@ -7051,10 +7061,9 @@
           <a:lstStyle/>
           <a:p>
             <a:r>
-              <a:rPr lang="en-US" dirty="0" smtClean="0"/>
+              <a:rPr lang="en-US" dirty="0"/>
               <a:t>Administrative Simplification</a:t>
             </a:r>
-            <a:endParaRPr lang="en-US" dirty="0"/>
           </a:p>
         </p:txBody>
       </p:sp>
@@ -7074,13 +7083,45 @@
           <a:lstStyle/>
           <a:p>
             <a:r>
-              <a:rPr lang="en-US" smtClean="0"/>
+              <a:rPr lang="en-US"/>
               <a:t>Spyridon Ganas</a:t>
             </a:r>
-            <a:endParaRPr lang="en-US"/>
-          </a:p>
-        </p:txBody>
-      </p:sp>
+          </a:p>
+        </p:txBody>
+      </p:sp>
+      <p:pic>
+        <p:nvPicPr>
+          <p:cNvPr id="5" name="Audio 4">
+            <a:hlinkClick r:id="" action="ppaction://media"/>
+          </p:cNvPr>
+          <p:cNvPicPr>
+            <a:picLocks noChangeAspect="1"/>
+          </p:cNvPicPr>
+          <p:nvPr>
+            <a:audioFile r:link="rId2"/>
+            <p:extLst>
+              <p:ext uri="{DAA4B4D4-6D71-4841-9C94-3DE7FCFB9230}">
+                <p14:media xmlns:p14="http://schemas.microsoft.com/office/powerpoint/2010/main" r:embed="rId1"/>
+              </p:ext>
+            </p:extLst>
+          </p:nvPr>
+        </p:nvPicPr>
+        <p:blipFill>
+          <a:blip r:embed="rId5"/>
+          <a:stretch>
+            <a:fillRect/>
+          </a:stretch>
+        </p:blipFill>
+        <p:spPr>
+          <a:xfrm>
+            <a:off x="12663889" y="6062949"/>
+            <a:ext cx="609600" cy="609600"/>
+          </a:xfrm>
+          <a:prstGeom prst="rect">
+            <a:avLst/>
+          </a:prstGeom>
+        </p:spPr>
+      </p:pic>
     </p:spTree>
     <p:extLst>
       <p:ext uri="{BB962C8B-B14F-4D97-AF65-F5344CB8AC3E}">
@@ -7091,6 +7132,101 @@
   <p:clrMapOvr>
     <a:masterClrMapping/>
   </p:clrMapOvr>
+  <mc:AlternateContent xmlns:mc="http://schemas.openxmlformats.org/markup-compatibility/2006" xmlns:p14="http://schemas.microsoft.com/office/powerpoint/2010/main">
+    <mc:Choice Requires="p14">
+      <p:transition spd="slow" p14:dur="2000" advTm="8833"/>
+    </mc:Choice>
+    <mc:Fallback xmlns="">
+      <p:transition spd="slow" advTm="8833"/>
+    </mc:Fallback>
+  </mc:AlternateContent>
+  <p:timing>
+    <p:tnLst>
+      <p:par>
+        <p:cTn id="1" dur="indefinite" restart="never" nodeType="tmRoot">
+          <p:childTnLst>
+            <p:seq concurrent="1" nextAc="seek">
+              <p:cTn id="2" dur="indefinite" nodeType="mainSeq">
+                <p:childTnLst>
+                  <p:par>
+                    <p:cTn id="3" fill="hold">
+                      <p:stCondLst>
+                        <p:cond delay="indefinite"/>
+                        <p:cond evt="onBegin" delay="0">
+                          <p:tn val="2"/>
+                        </p:cond>
+                      </p:stCondLst>
+                      <p:childTnLst>
+                        <p:par>
+                          <p:cTn id="4" fill="hold">
+                            <p:stCondLst>
+                              <p:cond delay="0"/>
+                            </p:stCondLst>
+                            <p:childTnLst>
+                              <p:par>
+                                <p:cTn id="5" presetID="1" presetClass="mediacall" presetSubtype="0" fill="hold" nodeType="afterEffect">
+                                  <p:stCondLst>
+                                    <p:cond delay="0"/>
+                                  </p:stCondLst>
+                                  <p:childTnLst>
+                                    <p:cmd type="call" cmd="playFrom(0.0)">
+                                      <p:cBhvr>
+                                        <p:cTn id="6" dur="1" fill="hold"/>
+                                        <p:tgtEl>
+                                          <p:spTgt spid="5"/>
+                                        </p:tgtEl>
+                                      </p:cBhvr>
+                                    </p:cmd>
+                                  </p:childTnLst>
+                                </p:cTn>
+                              </p:par>
+                            </p:childTnLst>
+                          </p:cTn>
+                        </p:par>
+                      </p:childTnLst>
+                    </p:cTn>
+                  </p:par>
+                </p:childTnLst>
+              </p:cTn>
+              <p:prevCondLst>
+                <p:cond evt="onPrev" delay="0">
+                  <p:tgtEl>
+                    <p:sldTgt/>
+                  </p:tgtEl>
+                </p:cond>
+              </p:prevCondLst>
+              <p:nextCondLst>
+                <p:cond evt="onNext" delay="0">
+                  <p:tgtEl>
+                    <p:sldTgt/>
+                  </p:tgtEl>
+                </p:cond>
+              </p:nextCondLst>
+            </p:seq>
+            <p:audio isNarration="1">
+              <p:cMediaNode vol="80000" showWhenStopped="0">
+                <p:cTn id="7" fill="hold" display="0">
+                  <p:stCondLst>
+                    <p:cond delay="indefinite"/>
+                  </p:stCondLst>
+                  <p:endCondLst>
+                    <p:cond evt="onStopAudio" delay="0">
+                      <p:tgtEl>
+                        <p:sldTgt/>
+                      </p:tgtEl>
+                    </p:cond>
+                  </p:endCondLst>
+                </p:cTn>
+                <p:tgtEl>
+                  <p:spTgt spid="5"/>
+                </p:tgtEl>
+              </p:cMediaNode>
+            </p:audio>
+          </p:childTnLst>
+        </p:cTn>
+      </p:par>
+    </p:tnLst>
+  </p:timing>
 </p:sld>
 </file>
 
@@ -7127,10 +7263,9 @@
           <a:lstStyle/>
           <a:p>
             <a:r>
-              <a:rPr lang="en-US" dirty="0" smtClean="0"/>
+              <a:rPr lang="en-US" dirty="0"/>
               <a:t>What is Administrative Simplification?</a:t>
             </a:r>
-            <a:endParaRPr lang="en-US" dirty="0"/>
           </a:p>
         </p:txBody>
       </p:sp>
@@ -7155,47 +7290,79 @@
           <a:lstStyle/>
           <a:p>
             <a:r>
-              <a:rPr lang="en-US" dirty="0" smtClean="0"/>
+              <a:rPr lang="en-US" dirty="0"/>
               <a:t>Many state agencies require data from health insurance organizations:</a:t>
             </a:r>
           </a:p>
           <a:p>
             <a:pPr lvl="1"/>
             <a:r>
-              <a:rPr lang="en-US" dirty="0" smtClean="0"/>
+              <a:rPr lang="en-US" dirty="0"/>
               <a:t>The Department of Insurance: Uses membership and claim data to regulate the industry.</a:t>
             </a:r>
           </a:p>
           <a:p>
             <a:pPr lvl="1"/>
             <a:r>
-              <a:rPr lang="en-US" dirty="0" smtClean="0"/>
+              <a:rPr lang="en-US" dirty="0"/>
               <a:t>The Group Insurance Commission: Uses claims data to develop provider tiers for the state government’s employee health plan.</a:t>
             </a:r>
           </a:p>
           <a:p>
             <a:pPr lvl="1"/>
             <a:r>
-              <a:rPr lang="en-US" dirty="0" smtClean="0"/>
+              <a:rPr lang="en-US" dirty="0"/>
               <a:t>Health Policy Commission: Conducts policy research.</a:t>
             </a:r>
           </a:p>
           <a:p>
             <a:pPr lvl="1"/>
             <a:r>
-              <a:rPr lang="en-US" dirty="0" smtClean="0"/>
+              <a:rPr lang="en-US" dirty="0"/>
               <a:t>Department of Public Health:  Monitoring public health initiatives.</a:t>
             </a:r>
           </a:p>
           <a:p>
             <a:r>
-              <a:rPr lang="en-US" dirty="0" smtClean="0"/>
+              <a:rPr lang="en-US" dirty="0"/>
               <a:t>Administrative Simplification reduces regulatory compliance costs for insurance organizations by helping government agencies use the APCD to meet their data needs.</a:t>
             </a:r>
-            <a:endParaRPr lang="en-US" dirty="0"/>
-          </a:p>
-        </p:txBody>
-      </p:sp>
+          </a:p>
+        </p:txBody>
+      </p:sp>
+      <p:pic>
+        <p:nvPicPr>
+          <p:cNvPr id="4" name="Audio 3">
+            <a:hlinkClick r:id="" action="ppaction://media"/>
+          </p:cNvPr>
+          <p:cNvPicPr>
+            <a:picLocks noChangeAspect="1"/>
+          </p:cNvPicPr>
+          <p:nvPr>
+            <a:audioFile r:link="rId2"/>
+            <p:extLst>
+              <p:ext uri="{DAA4B4D4-6D71-4841-9C94-3DE7FCFB9230}">
+                <p14:media xmlns:p14="http://schemas.microsoft.com/office/powerpoint/2010/main" r:embed="rId1"/>
+              </p:ext>
+            </p:extLst>
+          </p:nvPr>
+        </p:nvPicPr>
+        <p:blipFill>
+          <a:blip r:embed="rId4"/>
+          <a:stretch>
+            <a:fillRect/>
+          </a:stretch>
+        </p:blipFill>
+        <p:spPr>
+          <a:xfrm>
+            <a:off x="12652872" y="6107017"/>
+            <a:ext cx="609600" cy="609600"/>
+          </a:xfrm>
+          <a:prstGeom prst="rect">
+            <a:avLst/>
+          </a:prstGeom>
+        </p:spPr>
+      </p:pic>
     </p:spTree>
     <p:extLst>
       <p:ext uri="{BB962C8B-B14F-4D97-AF65-F5344CB8AC3E}">
@@ -7206,6 +7373,101 @@
   <p:clrMapOvr>
     <a:masterClrMapping/>
   </p:clrMapOvr>
+  <mc:AlternateContent xmlns:mc="http://schemas.openxmlformats.org/markup-compatibility/2006" xmlns:p14="http://schemas.microsoft.com/office/powerpoint/2010/main">
+    <mc:Choice Requires="p14">
+      <p:transition spd="slow" p14:dur="2000" advTm="38800"/>
+    </mc:Choice>
+    <mc:Fallback xmlns="">
+      <p:transition spd="slow" advTm="38800"/>
+    </mc:Fallback>
+  </mc:AlternateContent>
+  <p:timing>
+    <p:tnLst>
+      <p:par>
+        <p:cTn id="1" dur="indefinite" restart="never" nodeType="tmRoot">
+          <p:childTnLst>
+            <p:seq concurrent="1" nextAc="seek">
+              <p:cTn id="2" dur="indefinite" nodeType="mainSeq">
+                <p:childTnLst>
+                  <p:par>
+                    <p:cTn id="3" fill="hold">
+                      <p:stCondLst>
+                        <p:cond delay="indefinite"/>
+                        <p:cond evt="onBegin" delay="0">
+                          <p:tn val="2"/>
+                        </p:cond>
+                      </p:stCondLst>
+                      <p:childTnLst>
+                        <p:par>
+                          <p:cTn id="4" fill="hold">
+                            <p:stCondLst>
+                              <p:cond delay="0"/>
+                            </p:stCondLst>
+                            <p:childTnLst>
+                              <p:par>
+                                <p:cTn id="5" presetID="1" presetClass="mediacall" presetSubtype="0" fill="hold" nodeType="afterEffect">
+                                  <p:stCondLst>
+                                    <p:cond delay="0"/>
+                                  </p:stCondLst>
+                                  <p:childTnLst>
+                                    <p:cmd type="call" cmd="playFrom(0.0)">
+                                      <p:cBhvr>
+                                        <p:cTn id="6" dur="1" fill="hold"/>
+                                        <p:tgtEl>
+                                          <p:spTgt spid="4"/>
+                                        </p:tgtEl>
+                                      </p:cBhvr>
+                                    </p:cmd>
+                                  </p:childTnLst>
+                                </p:cTn>
+                              </p:par>
+                            </p:childTnLst>
+                          </p:cTn>
+                        </p:par>
+                      </p:childTnLst>
+                    </p:cTn>
+                  </p:par>
+                </p:childTnLst>
+              </p:cTn>
+              <p:prevCondLst>
+                <p:cond evt="onPrev" delay="0">
+                  <p:tgtEl>
+                    <p:sldTgt/>
+                  </p:tgtEl>
+                </p:cond>
+              </p:prevCondLst>
+              <p:nextCondLst>
+                <p:cond evt="onNext" delay="0">
+                  <p:tgtEl>
+                    <p:sldTgt/>
+                  </p:tgtEl>
+                </p:cond>
+              </p:nextCondLst>
+            </p:seq>
+            <p:audio isNarration="1">
+              <p:cMediaNode vol="80000" showWhenStopped="0">
+                <p:cTn id="7" fill="hold" display="0">
+                  <p:stCondLst>
+                    <p:cond delay="indefinite"/>
+                  </p:stCondLst>
+                  <p:endCondLst>
+                    <p:cond evt="onStopAudio" delay="0">
+                      <p:tgtEl>
+                        <p:sldTgt/>
+                      </p:tgtEl>
+                    </p:cond>
+                  </p:endCondLst>
+                </p:cTn>
+                <p:tgtEl>
+                  <p:spTgt spid="4"/>
+                </p:tgtEl>
+              </p:cMediaNode>
+            </p:audio>
+          </p:childTnLst>
+        </p:cTn>
+      </p:par>
+    </p:tnLst>
+  </p:timing>
 </p:sld>
 </file>
 
@@ -7242,10 +7504,9 @@
           <a:lstStyle/>
           <a:p>
             <a:r>
-              <a:rPr lang="en-US" dirty="0" smtClean="0"/>
+              <a:rPr lang="en-US" dirty="0"/>
               <a:t>Example – Merged Market Risk Adjustment</a:t>
             </a:r>
-            <a:endParaRPr lang="en-US" dirty="0"/>
           </a:p>
         </p:txBody>
       </p:sp>
@@ -7265,25 +7526,57 @@
           <a:lstStyle/>
           <a:p>
             <a:r>
-              <a:rPr lang="en-US" dirty="0" smtClean="0"/>
+              <a:rPr lang="en-US" dirty="0"/>
               <a:t>Under the ACA, premiums are transferred from insurance companies with healthy populations to those companies that insure sicker patient.  This process is known as Risk Adjustment.</a:t>
             </a:r>
           </a:p>
           <a:p>
             <a:r>
-              <a:rPr lang="en-US" dirty="0" smtClean="0"/>
+              <a:rPr lang="en-US" dirty="0"/>
               <a:t>The health of individual patients is estimated by analyzing their recent medical history.  This estimate of the patient’s health is know as their Risk Score.</a:t>
             </a:r>
           </a:p>
           <a:p>
             <a:r>
-              <a:rPr lang="en-US" dirty="0" smtClean="0"/>
+              <a:rPr lang="en-US" dirty="0"/>
               <a:t>In Massachusetts, data for the risk score calculation was extracted from the APCD.  </a:t>
             </a:r>
-            <a:endParaRPr lang="en-US" dirty="0"/>
-          </a:p>
-        </p:txBody>
-      </p:sp>
+          </a:p>
+        </p:txBody>
+      </p:sp>
+      <p:pic>
+        <p:nvPicPr>
+          <p:cNvPr id="4" name="Audio 3">
+            <a:hlinkClick r:id="" action="ppaction://media"/>
+          </p:cNvPr>
+          <p:cNvPicPr>
+            <a:picLocks noChangeAspect="1"/>
+          </p:cNvPicPr>
+          <p:nvPr>
+            <a:audioFile r:link="rId2"/>
+            <p:extLst>
+              <p:ext uri="{DAA4B4D4-6D71-4841-9C94-3DE7FCFB9230}">
+                <p14:media xmlns:p14="http://schemas.microsoft.com/office/powerpoint/2010/main" r:embed="rId1"/>
+              </p:ext>
+            </p:extLst>
+          </p:nvPr>
+        </p:nvPicPr>
+        <p:blipFill>
+          <a:blip r:embed="rId4"/>
+          <a:stretch>
+            <a:fillRect/>
+          </a:stretch>
+        </p:blipFill>
+        <p:spPr>
+          <a:xfrm>
+            <a:off x="13060497" y="6040915"/>
+            <a:ext cx="609600" cy="609600"/>
+          </a:xfrm>
+          <a:prstGeom prst="rect">
+            <a:avLst/>
+          </a:prstGeom>
+        </p:spPr>
+      </p:pic>
     </p:spTree>
     <p:extLst>
       <p:ext uri="{BB962C8B-B14F-4D97-AF65-F5344CB8AC3E}">
@@ -7294,6 +7587,101 @@
   <p:clrMapOvr>
     <a:masterClrMapping/>
   </p:clrMapOvr>
+  <mc:AlternateContent xmlns:mc="http://schemas.openxmlformats.org/markup-compatibility/2006" xmlns:p14="http://schemas.microsoft.com/office/powerpoint/2010/main">
+    <mc:Choice Requires="p14">
+      <p:transition spd="slow" p14:dur="2000" advTm="46188"/>
+    </mc:Choice>
+    <mc:Fallback xmlns="">
+      <p:transition spd="slow" advTm="46188"/>
+    </mc:Fallback>
+  </mc:AlternateContent>
+  <p:timing>
+    <p:tnLst>
+      <p:par>
+        <p:cTn id="1" dur="indefinite" restart="never" nodeType="tmRoot">
+          <p:childTnLst>
+            <p:seq concurrent="1" nextAc="seek">
+              <p:cTn id="2" dur="indefinite" nodeType="mainSeq">
+                <p:childTnLst>
+                  <p:par>
+                    <p:cTn id="3" fill="hold">
+                      <p:stCondLst>
+                        <p:cond delay="indefinite"/>
+                        <p:cond evt="onBegin" delay="0">
+                          <p:tn val="2"/>
+                        </p:cond>
+                      </p:stCondLst>
+                      <p:childTnLst>
+                        <p:par>
+                          <p:cTn id="4" fill="hold">
+                            <p:stCondLst>
+                              <p:cond delay="0"/>
+                            </p:stCondLst>
+                            <p:childTnLst>
+                              <p:par>
+                                <p:cTn id="5" presetID="1" presetClass="mediacall" presetSubtype="0" fill="hold" nodeType="afterEffect">
+                                  <p:stCondLst>
+                                    <p:cond delay="0"/>
+                                  </p:stCondLst>
+                                  <p:childTnLst>
+                                    <p:cmd type="call" cmd="playFrom(0.0)">
+                                      <p:cBhvr>
+                                        <p:cTn id="6" dur="1" fill="hold"/>
+                                        <p:tgtEl>
+                                          <p:spTgt spid="4"/>
+                                        </p:tgtEl>
+                                      </p:cBhvr>
+                                    </p:cmd>
+                                  </p:childTnLst>
+                                </p:cTn>
+                              </p:par>
+                            </p:childTnLst>
+                          </p:cTn>
+                        </p:par>
+                      </p:childTnLst>
+                    </p:cTn>
+                  </p:par>
+                </p:childTnLst>
+              </p:cTn>
+              <p:prevCondLst>
+                <p:cond evt="onPrev" delay="0">
+                  <p:tgtEl>
+                    <p:sldTgt/>
+                  </p:tgtEl>
+                </p:cond>
+              </p:prevCondLst>
+              <p:nextCondLst>
+                <p:cond evt="onNext" delay="0">
+                  <p:tgtEl>
+                    <p:sldTgt/>
+                  </p:tgtEl>
+                </p:cond>
+              </p:nextCondLst>
+            </p:seq>
+            <p:audio isNarration="1">
+              <p:cMediaNode vol="80000" showWhenStopped="0">
+                <p:cTn id="7" fill="hold" display="0">
+                  <p:stCondLst>
+                    <p:cond delay="indefinite"/>
+                  </p:stCondLst>
+                  <p:endCondLst>
+                    <p:cond evt="onStopAudio" delay="0">
+                      <p:tgtEl>
+                        <p:sldTgt/>
+                      </p:tgtEl>
+                    </p:cond>
+                  </p:endCondLst>
+                </p:cTn>
+                <p:tgtEl>
+                  <p:spTgt spid="4"/>
+                </p:tgtEl>
+              </p:cMediaNode>
+            </p:audio>
+          </p:childTnLst>
+        </p:cTn>
+      </p:par>
+    </p:tnLst>
+  </p:timing>
 </p:sld>
 </file>
 
@@ -7330,44 +7718,76 @@
           <a:lstStyle/>
           <a:p>
             <a:r>
-              <a:rPr lang="en-US" dirty="0" smtClean="0"/>
+              <a:rPr lang="en-US" dirty="0"/>
               <a:t>Example – DOI Membership Reporting</a:t>
             </a:r>
+          </a:p>
+        </p:txBody>
+      </p:sp>
+      <p:sp>
+        <p:nvSpPr>
+          <p:cNvPr id="3" name="Content Placeholder 2"/>
+          <p:cNvSpPr>
+            <a:spLocks noGrp="1"/>
+          </p:cNvSpPr>
+          <p:nvPr>
+            <p:ph idx="1"/>
+          </p:nvPr>
+        </p:nvSpPr>
+        <p:spPr/>
+        <p:txBody>
+          <a:bodyPr/>
+          <a:lstStyle/>
+          <a:p>
+            <a:r>
+              <a:rPr lang="en-US" dirty="0"/>
+              <a:t>In Massachusetts, health insurance organizations are required to submit quarterly membership reports to the Department of Insurance.</a:t>
+            </a:r>
+          </a:p>
+          <a:p>
+            <a:r>
+              <a:rPr lang="en-US" dirty="0"/>
+              <a:t>In 2016, these reports were redesigned to use data from the APCD.</a:t>
+            </a:r>
+          </a:p>
+          <a:p>
             <a:endParaRPr lang="en-US" dirty="0"/>
           </a:p>
         </p:txBody>
       </p:sp>
-      <p:sp>
-        <p:nvSpPr>
-          <p:cNvPr id="3" name="Content Placeholder 2"/>
-          <p:cNvSpPr>
-            <a:spLocks noGrp="1"/>
-          </p:cNvSpPr>
-          <p:nvPr>
-            <p:ph idx="1"/>
-          </p:nvPr>
-        </p:nvSpPr>
-        <p:spPr/>
-        <p:txBody>
-          <a:bodyPr/>
-          <a:lstStyle/>
-          <a:p>
-            <a:r>
-              <a:rPr lang="en-US" dirty="0" smtClean="0"/>
-              <a:t>In Massachusetts, health insurance organizations are required to submit quarterly membership reports to the Department of Insurance.</a:t>
-            </a:r>
-          </a:p>
-          <a:p>
-            <a:r>
-              <a:rPr lang="en-US" dirty="0" smtClean="0"/>
-              <a:t>In 2016, these reports were redesigned to use data from the APCD.</a:t>
-            </a:r>
-          </a:p>
-          <a:p>
-            <a:endParaRPr lang="en-US" dirty="0"/>
-          </a:p>
-        </p:txBody>
-      </p:sp>
+      <p:pic>
+        <p:nvPicPr>
+          <p:cNvPr id="4" name="Audio 3">
+            <a:hlinkClick r:id="" action="ppaction://media"/>
+          </p:cNvPr>
+          <p:cNvPicPr>
+            <a:picLocks noChangeAspect="1"/>
+          </p:cNvPicPr>
+          <p:nvPr>
+            <a:audioFile r:link="rId2"/>
+            <p:extLst>
+              <p:ext uri="{DAA4B4D4-6D71-4841-9C94-3DE7FCFB9230}">
+                <p14:media xmlns:p14="http://schemas.microsoft.com/office/powerpoint/2010/main" r:embed="rId1"/>
+              </p:ext>
+            </p:extLst>
+          </p:nvPr>
+        </p:nvPicPr>
+        <p:blipFill>
+          <a:blip r:embed="rId4"/>
+          <a:stretch>
+            <a:fillRect/>
+          </a:stretch>
+        </p:blipFill>
+        <p:spPr>
+          <a:xfrm>
+            <a:off x="12663889" y="5996848"/>
+            <a:ext cx="609600" cy="609600"/>
+          </a:xfrm>
+          <a:prstGeom prst="rect">
+            <a:avLst/>
+          </a:prstGeom>
+        </p:spPr>
+      </p:pic>
     </p:spTree>
     <p:extLst>
       <p:ext uri="{BB962C8B-B14F-4D97-AF65-F5344CB8AC3E}">
@@ -7378,6 +7798,101 @@
   <p:clrMapOvr>
     <a:masterClrMapping/>
   </p:clrMapOvr>
+  <mc:AlternateContent xmlns:mc="http://schemas.openxmlformats.org/markup-compatibility/2006" xmlns:p14="http://schemas.microsoft.com/office/powerpoint/2010/main">
+    <mc:Choice Requires="p14">
+      <p:transition spd="slow" p14:dur="2000" advTm="23849"/>
+    </mc:Choice>
+    <mc:Fallback xmlns="">
+      <p:transition spd="slow" advTm="23849"/>
+    </mc:Fallback>
+  </mc:AlternateContent>
+  <p:timing>
+    <p:tnLst>
+      <p:par>
+        <p:cTn id="1" dur="indefinite" restart="never" nodeType="tmRoot">
+          <p:childTnLst>
+            <p:seq concurrent="1" nextAc="seek">
+              <p:cTn id="2" dur="indefinite" nodeType="mainSeq">
+                <p:childTnLst>
+                  <p:par>
+                    <p:cTn id="3" fill="hold">
+                      <p:stCondLst>
+                        <p:cond delay="indefinite"/>
+                        <p:cond evt="onBegin" delay="0">
+                          <p:tn val="2"/>
+                        </p:cond>
+                      </p:stCondLst>
+                      <p:childTnLst>
+                        <p:par>
+                          <p:cTn id="4" fill="hold">
+                            <p:stCondLst>
+                              <p:cond delay="0"/>
+                            </p:stCondLst>
+                            <p:childTnLst>
+                              <p:par>
+                                <p:cTn id="5" presetID="1" presetClass="mediacall" presetSubtype="0" fill="hold" nodeType="afterEffect">
+                                  <p:stCondLst>
+                                    <p:cond delay="0"/>
+                                  </p:stCondLst>
+                                  <p:childTnLst>
+                                    <p:cmd type="call" cmd="playFrom(0.0)">
+                                      <p:cBhvr>
+                                        <p:cTn id="6" dur="1" fill="hold"/>
+                                        <p:tgtEl>
+                                          <p:spTgt spid="4"/>
+                                        </p:tgtEl>
+                                      </p:cBhvr>
+                                    </p:cmd>
+                                  </p:childTnLst>
+                                </p:cTn>
+                              </p:par>
+                            </p:childTnLst>
+                          </p:cTn>
+                        </p:par>
+                      </p:childTnLst>
+                    </p:cTn>
+                  </p:par>
+                </p:childTnLst>
+              </p:cTn>
+              <p:prevCondLst>
+                <p:cond evt="onPrev" delay="0">
+                  <p:tgtEl>
+                    <p:sldTgt/>
+                  </p:tgtEl>
+                </p:cond>
+              </p:prevCondLst>
+              <p:nextCondLst>
+                <p:cond evt="onNext" delay="0">
+                  <p:tgtEl>
+                    <p:sldTgt/>
+                  </p:tgtEl>
+                </p:cond>
+              </p:nextCondLst>
+            </p:seq>
+            <p:audio isNarration="1">
+              <p:cMediaNode vol="80000" showWhenStopped="0">
+                <p:cTn id="7" fill="hold" display="0">
+                  <p:stCondLst>
+                    <p:cond delay="indefinite"/>
+                  </p:stCondLst>
+                  <p:endCondLst>
+                    <p:cond evt="onStopAudio" delay="0">
+                      <p:tgtEl>
+                        <p:sldTgt/>
+                      </p:tgtEl>
+                    </p:cond>
+                  </p:endCondLst>
+                </p:cTn>
+                <p:tgtEl>
+                  <p:spTgt spid="4"/>
+                </p:tgtEl>
+              </p:cMediaNode>
+            </p:audio>
+          </p:childTnLst>
+        </p:cTn>
+      </p:par>
+    </p:tnLst>
+  </p:timing>
 </p:sld>
 </file>
 
@@ -7414,11 +7929,11 @@
           <a:lstStyle/>
           <a:p>
             <a:r>
-              <a:rPr lang="en-US" dirty="0" smtClean="0"/>
+              <a:rPr lang="en-US" dirty="0"/>
               <a:t>Example – GIC </a:t>
             </a:r>
             <a:r>
-              <a:rPr lang="en-US" dirty="0" err="1" smtClean="0"/>
+              <a:rPr lang="en-US" dirty="0" err="1"/>
               <a:t>Tiering</a:t>
             </a:r>
             <a:endParaRPr lang="en-US" dirty="0"/>
@@ -7441,25 +7956,57 @@
           <a:lstStyle/>
           <a:p>
             <a:r>
-              <a:rPr lang="en-US" dirty="0" smtClean="0"/>
+              <a:rPr lang="en-US" dirty="0"/>
               <a:t>The Group Insurance Commission ranks doctors based on the cost and quality of the care they provide.</a:t>
             </a:r>
           </a:p>
           <a:p>
             <a:r>
-              <a:rPr lang="en-US" dirty="0" smtClean="0"/>
+              <a:rPr lang="en-US" dirty="0"/>
               <a:t>This ranking process uses detailed claims data.  Historically, this required insurance companies to submit data directly to the GIC.</a:t>
             </a:r>
           </a:p>
           <a:p>
             <a:r>
-              <a:rPr lang="en-US" dirty="0" smtClean="0"/>
+              <a:rPr lang="en-US" dirty="0"/>
               <a:t>A project is underway to source this data from the APCD.</a:t>
             </a:r>
-            <a:endParaRPr lang="en-US" dirty="0"/>
-          </a:p>
-        </p:txBody>
-      </p:sp>
+          </a:p>
+        </p:txBody>
+      </p:sp>
+      <p:pic>
+        <p:nvPicPr>
+          <p:cNvPr id="4" name="Audio 3">
+            <a:hlinkClick r:id="" action="ppaction://media"/>
+          </p:cNvPr>
+          <p:cNvPicPr>
+            <a:picLocks noChangeAspect="1"/>
+          </p:cNvPicPr>
+          <p:nvPr>
+            <a:audioFile r:link="rId2"/>
+            <p:extLst>
+              <p:ext uri="{DAA4B4D4-6D71-4841-9C94-3DE7FCFB9230}">
+                <p14:media xmlns:p14="http://schemas.microsoft.com/office/powerpoint/2010/main" r:embed="rId1"/>
+              </p:ext>
+            </p:extLst>
+          </p:nvPr>
+        </p:nvPicPr>
+        <p:blipFill>
+          <a:blip r:embed="rId4"/>
+          <a:stretch>
+            <a:fillRect/>
+          </a:stretch>
+        </p:blipFill>
+        <p:spPr>
+          <a:xfrm>
+            <a:off x="12564737" y="6118033"/>
+            <a:ext cx="609600" cy="609600"/>
+          </a:xfrm>
+          <a:prstGeom prst="rect">
+            <a:avLst/>
+          </a:prstGeom>
+        </p:spPr>
+      </p:pic>
     </p:spTree>
     <p:extLst>
       <p:ext uri="{BB962C8B-B14F-4D97-AF65-F5344CB8AC3E}">
@@ -7470,6 +8017,101 @@
   <p:clrMapOvr>
     <a:masterClrMapping/>
   </p:clrMapOvr>
+  <mc:AlternateContent xmlns:mc="http://schemas.openxmlformats.org/markup-compatibility/2006" xmlns:p14="http://schemas.microsoft.com/office/powerpoint/2010/main">
+    <mc:Choice Requires="p14">
+      <p:transition spd="slow" p14:dur="2000" advTm="18767"/>
+    </mc:Choice>
+    <mc:Fallback xmlns="">
+      <p:transition spd="slow" advTm="18767"/>
+    </mc:Fallback>
+  </mc:AlternateContent>
+  <p:timing>
+    <p:tnLst>
+      <p:par>
+        <p:cTn id="1" dur="indefinite" restart="never" nodeType="tmRoot">
+          <p:childTnLst>
+            <p:seq concurrent="1" nextAc="seek">
+              <p:cTn id="2" dur="indefinite" nodeType="mainSeq">
+                <p:childTnLst>
+                  <p:par>
+                    <p:cTn id="3" fill="hold">
+                      <p:stCondLst>
+                        <p:cond delay="indefinite"/>
+                        <p:cond evt="onBegin" delay="0">
+                          <p:tn val="2"/>
+                        </p:cond>
+                      </p:stCondLst>
+                      <p:childTnLst>
+                        <p:par>
+                          <p:cTn id="4" fill="hold">
+                            <p:stCondLst>
+                              <p:cond delay="0"/>
+                            </p:stCondLst>
+                            <p:childTnLst>
+                              <p:par>
+                                <p:cTn id="5" presetID="1" presetClass="mediacall" presetSubtype="0" fill="hold" nodeType="afterEffect">
+                                  <p:stCondLst>
+                                    <p:cond delay="0"/>
+                                  </p:stCondLst>
+                                  <p:childTnLst>
+                                    <p:cmd type="call" cmd="playFrom(0.0)">
+                                      <p:cBhvr>
+                                        <p:cTn id="6" dur="1" fill="hold"/>
+                                        <p:tgtEl>
+                                          <p:spTgt spid="4"/>
+                                        </p:tgtEl>
+                                      </p:cBhvr>
+                                    </p:cmd>
+                                  </p:childTnLst>
+                                </p:cTn>
+                              </p:par>
+                            </p:childTnLst>
+                          </p:cTn>
+                        </p:par>
+                      </p:childTnLst>
+                    </p:cTn>
+                  </p:par>
+                </p:childTnLst>
+              </p:cTn>
+              <p:prevCondLst>
+                <p:cond evt="onPrev" delay="0">
+                  <p:tgtEl>
+                    <p:sldTgt/>
+                  </p:tgtEl>
+                </p:cond>
+              </p:prevCondLst>
+              <p:nextCondLst>
+                <p:cond evt="onNext" delay="0">
+                  <p:tgtEl>
+                    <p:sldTgt/>
+                  </p:tgtEl>
+                </p:cond>
+              </p:nextCondLst>
+            </p:seq>
+            <p:audio isNarration="1">
+              <p:cMediaNode vol="80000" showWhenStopped="0">
+                <p:cTn id="7" fill="hold" display="0">
+                  <p:stCondLst>
+                    <p:cond delay="indefinite"/>
+                  </p:stCondLst>
+                  <p:endCondLst>
+                    <p:cond evt="onStopAudio" delay="0">
+                      <p:tgtEl>
+                        <p:sldTgt/>
+                      </p:tgtEl>
+                    </p:cond>
+                  </p:endCondLst>
+                </p:cTn>
+                <p:tgtEl>
+                  <p:spTgt spid="4"/>
+                </p:tgtEl>
+              </p:cMediaNode>
+            </p:audio>
+          </p:childTnLst>
+        </p:cTn>
+      </p:par>
+    </p:tnLst>
+  </p:timing>
 </p:sld>
 </file>
 
@@ -7506,10 +8148,9 @@
           <a:lstStyle/>
           <a:p>
             <a:r>
-              <a:rPr lang="en-US" dirty="0" smtClean="0"/>
+              <a:rPr lang="en-US" dirty="0"/>
               <a:t>References</a:t>
             </a:r>
-            <a:endParaRPr lang="en-US" dirty="0"/>
           </a:p>
         </p:txBody>
       </p:sp>
@@ -7534,60 +8175,36 @@
               <a:rPr lang="en-US" dirty="0">
                 <a:hlinkClick r:id="rId2"/>
               </a:rPr>
-              <a:t>http://</a:t>
-            </a:r>
-            <a:r>
-              <a:rPr lang="en-US" dirty="0" smtClean="0">
-                <a:hlinkClick r:id="rId2"/>
-              </a:rPr>
-              <a:t>www.chiamass.gov/government-agency-apcd-requests</a:t>
-            </a:r>
-            <a:endParaRPr lang="en-US" dirty="0" smtClean="0"/>
+              <a:t>http://www.chiamass.gov/government-agency-apcd-requests</a:t>
+            </a:r>
+            <a:endParaRPr lang="en-US" dirty="0"/>
           </a:p>
           <a:p>
             <a:r>
               <a:rPr lang="en-US" dirty="0">
                 <a:hlinkClick r:id="rId3"/>
               </a:rPr>
-              <a:t>http://</a:t>
-            </a:r>
-            <a:r>
-              <a:rPr lang="en-US" dirty="0" smtClean="0">
-                <a:hlinkClick r:id="rId3"/>
-              </a:rPr>
-              <a:t>www.mass.gov/anf/employee-insurance-and-retirement-benefits/oversight-agencies/gic/what-is-the-gic.html</a:t>
-            </a:r>
-            <a:endParaRPr lang="en-US" dirty="0" smtClean="0"/>
+              <a:t>http://www.mass.gov/anf/employee-insurance-and-retirement-benefits/oversight-agencies/gic/what-is-the-gic.html</a:t>
+            </a:r>
+            <a:endParaRPr lang="en-US" dirty="0"/>
           </a:p>
           <a:p>
             <a:r>
               <a:rPr lang="en-US">
                 <a:hlinkClick r:id="rId4"/>
               </a:rPr>
-              <a:t>http://</a:t>
-            </a:r>
-            <a:r>
-              <a:rPr lang="en-US" smtClean="0">
-                <a:hlinkClick r:id="rId4"/>
-              </a:rPr>
-              <a:t>www.fchp.org/providers/resources/gic-tiering.aspx</a:t>
-            </a:r>
-            <a:endParaRPr lang="en-US" dirty="0" smtClean="0"/>
+              <a:t>http://www.fchp.org/providers/resources/gic-tiering.aspx</a:t>
+            </a:r>
+            <a:endParaRPr lang="en-US" dirty="0"/>
           </a:p>
           <a:p>
             <a:r>
               <a:rPr lang="en-US" dirty="0">
                 <a:hlinkClick r:id="rId5"/>
               </a:rPr>
-              <a:t>https://</a:t>
-            </a:r>
-            <a:r>
-              <a:rPr lang="en-US" dirty="0" smtClean="0">
-                <a:hlinkClick r:id="rId5"/>
-              </a:rPr>
-              <a:t>betterhealthconnector.com/wp-content/uploads/board_meetings/2015/2015-07-09/Board-Memo-Risk-Adjustment-Update-070615.pdf</a:t>
-            </a:r>
-            <a:endParaRPr lang="en-US" dirty="0" smtClean="0"/>
+              <a:t>https://betterhealthconnector.com/wp-content/uploads/board_meetings/2015/2015-07-09/Board-Memo-Risk-Adjustment-Update-070615.pdf</a:t>
+            </a:r>
+            <a:endParaRPr lang="en-US" dirty="0"/>
           </a:p>
           <a:p>
             <a:endParaRPr lang="en-US" dirty="0"/>
@@ -7604,6 +8221,14 @@
   <p:clrMapOvr>
     <a:masterClrMapping/>
   </p:clrMapOvr>
+  <mc:AlternateContent xmlns:mc="http://schemas.openxmlformats.org/markup-compatibility/2006" xmlns:p14="http://schemas.microsoft.com/office/powerpoint/2010/main">
+    <mc:Choice Requires="p14">
+      <p:transition spd="slow" p14:dur="2000" advTm="4516"/>
+    </mc:Choice>
+    <mc:Fallback xmlns="">
+      <p:transition spd="slow" advTm="4516"/>
+    </mc:Fallback>
+  </mc:AlternateContent>
 </p:sld>
 </file>
 
@@ -8107,7 +8732,7 @@
   <a:extraClrSchemeLst/>
   <a:extLst>
     <a:ext uri="{05A4C25C-085E-4340-85A3-A5531E510DB2}">
-      <thm15:themeFamily xmlns:thm15="http://schemas.microsoft.com/office/thememl/2012/main" xmlns="" name="Gallery" id="{BBFCD31E-59A1-489D-B089-A3EAD7CAE12E}" vid="{AC464412-510E-4F2B-8947-A0DDBD028997}"/>
+      <thm15:themeFamily xmlns:thm15="http://schemas.microsoft.com/office/thememl/2012/main" name="Gallery" id="{BBFCD31E-59A1-489D-B089-A3EAD7CAE12E}" vid="{AC464412-510E-4F2B-8947-A0DDBD028997}"/>
     </a:ext>
   </a:extLst>
 </a:theme>

</xml_diff>